<commit_message>
Change to v2.1, add association between Parser and Command
</commit_message>
<xml_diff>
--- a/docs/Class Diagram.pptx
+++ b/docs/Class Diagram.pptx
@@ -6273,7 +6273,7 @@
         </p:nvSpPr>
         <p:spPr>
           <a:xfrm>
-            <a:off x="5363375" y="3645050"/>
+            <a:off x="4885832" y="3873362"/>
             <a:ext cx="2525700" cy="339600"/>
           </a:xfrm>
           <a:prstGeom prst="rect">
@@ -6858,7 +6858,7 @@
               <a:buNone/>
             </a:pPr>
             <a:r>
-              <a:rPr lang="en" sz="1300">
+              <a:rPr lang="en" sz="1300" dirty="0">
                 <a:latin typeface="Calibri"/>
                 <a:ea typeface="Calibri"/>
                 <a:cs typeface="Calibri"/>
@@ -6866,7 +6866,7 @@
               </a:rPr>
               <a:t>myBudget</a:t>
             </a:r>
-            <a:endParaRPr sz="1300" b="0" i="0" u="none" strike="noStrike" cap="none">
+            <a:endParaRPr sz="1300" b="0" i="0" u="none" strike="noStrike" cap="none" dirty="0">
               <a:solidFill>
                 <a:srgbClr val="000000"/>
               </a:solidFill>
@@ -7414,84 +7414,6 @@
       </p:sp>
       <p:sp>
         <p:nvSpPr>
-          <p:cNvPr id="72" name="Google Shape;72;p14"/>
-          <p:cNvSpPr/>
-          <p:nvPr/>
-        </p:nvSpPr>
-        <p:spPr>
-          <a:xfrm>
-            <a:off x="5363375" y="3952850"/>
-            <a:ext cx="2525700" cy="410100"/>
-          </a:xfrm>
-          <a:prstGeom prst="rect">
-            <a:avLst/>
-          </a:prstGeom>
-          <a:gradFill>
-            <a:gsLst>
-              <a:gs pos="0">
-                <a:srgbClr val="DAFEA4"/>
-              </a:gs>
-              <a:gs pos="35000">
-                <a:srgbClr val="E3FEBF"/>
-              </a:gs>
-              <a:gs pos="100000">
-                <a:srgbClr val="F4FEE6"/>
-              </a:gs>
-            </a:gsLst>
-            <a:lin ang="16198662" scaled="0"/>
-          </a:gradFill>
-          <a:ln w="19050" cap="flat" cmpd="sng">
-            <a:solidFill>
-              <a:srgbClr val="97B853"/>
-            </a:solidFill>
-            <a:prstDash val="solid"/>
-            <a:round/>
-            <a:headEnd type="none" w="sm" len="sm"/>
-            <a:tailEnd type="none" w="sm" len="sm"/>
-          </a:ln>
-          <a:effectLst>
-            <a:outerShdw blurRad="40000" dist="20000" dir="5400000" rotWithShape="0">
-              <a:srgbClr val="000000">
-                <a:alpha val="37650"/>
-              </a:srgbClr>
-            </a:outerShdw>
-          </a:effectLst>
-        </p:spPr>
-        <p:txBody>
-          <a:bodyPr spcFirstLastPara="1" wrap="square" lIns="91425" tIns="45700" rIns="91425" bIns="45700" anchor="ctr" anchorCtr="0">
-            <a:noAutofit/>
-          </a:bodyPr>
-          <a:lstStyle/>
-          <a:p>
-            <a:pPr marL="0" marR="0" lvl="0" indent="0" algn="l" rtl="0">
-              <a:spcBef>
-                <a:spcPts val="0"/>
-              </a:spcBef>
-              <a:spcAft>
-                <a:spcPts val="0"/>
-              </a:spcAft>
-              <a:buNone/>
-            </a:pPr>
-            <a:r>
-              <a:rPr lang="en" sz="900" u="sng">
-                <a:latin typeface="Calibri"/>
-                <a:ea typeface="Calibri"/>
-                <a:cs typeface="Calibri"/>
-                <a:sym typeface="Calibri"/>
-              </a:rPr>
-              <a:t>-newCommand:Command</a:t>
-            </a:r>
-            <a:endParaRPr sz="900" u="sng">
-              <a:latin typeface="Calibri"/>
-              <a:ea typeface="Calibri"/>
-              <a:cs typeface="Calibri"/>
-              <a:sym typeface="Calibri"/>
-            </a:endParaRPr>
-          </a:p>
-        </p:txBody>
-      </p:sp>
-      <p:sp>
-        <p:nvSpPr>
           <p:cNvPr id="73" name="Google Shape;73;p14"/>
           <p:cNvSpPr txBox="1"/>
           <p:nvPr/>
@@ -7782,7 +7704,7 @@
         </p:nvSpPr>
         <p:spPr>
           <a:xfrm>
-            <a:off x="5360016" y="4362950"/>
+            <a:off x="4885832" y="4208974"/>
             <a:ext cx="2525700" cy="464600"/>
           </a:xfrm>
           <a:prstGeom prst="rect">
@@ -9005,8 +8927,8 @@
         </p:nvCxnSpPr>
         <p:spPr>
           <a:xfrm rot="16200000" flipH="1">
-            <a:off x="5135695" y="2154520"/>
-            <a:ext cx="926834" cy="2054225"/>
+            <a:off x="4782768" y="2507448"/>
+            <a:ext cx="1155146" cy="1576682"/>
           </a:xfrm>
           <a:prstGeom prst="bentConnector3">
             <a:avLst>
@@ -9060,7 +8982,7 @@
               <a:buNone/>
             </a:pPr>
             <a:r>
-              <a:rPr lang="en" sz="1300">
+              <a:rPr lang="en" sz="1300" dirty="0">
                 <a:latin typeface="Calibri"/>
                 <a:ea typeface="Calibri"/>
                 <a:cs typeface="Calibri"/>
@@ -9069,7 +8991,7 @@
               <a:t>0..</a:t>
             </a:r>
             <a:r>
-              <a:rPr lang="en" sz="1300" b="0" i="0" u="none" strike="noStrike" cap="none">
+              <a:rPr lang="en" sz="1300" b="0" i="0" u="none" strike="noStrike" cap="none" dirty="0">
                 <a:solidFill>
                   <a:srgbClr val="000000"/>
                 </a:solidFill>
@@ -9080,7 +9002,7 @@
               </a:rPr>
               <a:t>1</a:t>
             </a:r>
-            <a:endParaRPr sz="1300" b="0" i="0" u="none" strike="noStrike" cap="none">
+            <a:endParaRPr sz="1300" b="0" i="0" u="none" strike="noStrike" cap="none" dirty="0">
               <a:solidFill>
                 <a:srgbClr val="000000"/>
               </a:solidFill>
@@ -9568,6 +9490,167 @@
           </a:ln>
         </p:spPr>
       </p:cxnSp>
+      <p:cxnSp>
+        <p:nvCxnSpPr>
+          <p:cNvPr id="41" name="Google Shape;84;p14">
+            <a:extLst>
+              <a:ext uri="{FF2B5EF4-FFF2-40B4-BE49-F238E27FC236}">
+                <a16:creationId xmlns:a16="http://schemas.microsoft.com/office/drawing/2014/main" id="{7A94EB2B-4131-4155-BEF2-0E90C5503C10}"/>
+              </a:ext>
+            </a:extLst>
+          </p:cNvPr>
+          <p:cNvCxnSpPr>
+            <a:cxnSpLocks/>
+            <a:stCxn id="59" idx="3"/>
+            <a:endCxn id="86" idx="2"/>
+          </p:cNvCxnSpPr>
+          <p:nvPr/>
+        </p:nvCxnSpPr>
+        <p:spPr>
+          <a:xfrm flipV="1">
+            <a:off x="7411532" y="3440838"/>
+            <a:ext cx="702568" cy="602324"/>
+          </a:xfrm>
+          <a:prstGeom prst="bentConnector2">
+            <a:avLst/>
+          </a:prstGeom>
+          <a:noFill/>
+          <a:ln w="19050" cap="flat" cmpd="sng">
+            <a:solidFill>
+              <a:schemeClr val="dk1"/>
+            </a:solidFill>
+            <a:prstDash val="solid"/>
+            <a:round/>
+            <a:headEnd type="none" w="sm" len="sm"/>
+            <a:tailEnd type="stealth" w="med" len="med"/>
+          </a:ln>
+        </p:spPr>
+      </p:cxnSp>
+      <p:sp>
+        <p:nvSpPr>
+          <p:cNvPr id="45" name="Google Shape;89;p14">
+            <a:extLst>
+              <a:ext uri="{FF2B5EF4-FFF2-40B4-BE49-F238E27FC236}">
+                <a16:creationId xmlns:a16="http://schemas.microsoft.com/office/drawing/2014/main" id="{6ABD8BC0-BB44-43C0-A9C8-45F95062E0DA}"/>
+              </a:ext>
+            </a:extLst>
+          </p:cNvPr>
+          <p:cNvSpPr txBox="1"/>
+          <p:nvPr/>
+        </p:nvSpPr>
+        <p:spPr>
+          <a:xfrm>
+            <a:off x="8145688" y="3484000"/>
+            <a:ext cx="235801" cy="339600"/>
+          </a:xfrm>
+          <a:prstGeom prst="rect">
+            <a:avLst/>
+          </a:prstGeom>
+          <a:noFill/>
+          <a:ln>
+            <a:noFill/>
+          </a:ln>
+        </p:spPr>
+        <p:txBody>
+          <a:bodyPr spcFirstLastPara="1" wrap="square" lIns="91425" tIns="45700" rIns="91425" bIns="45700" anchor="t" anchorCtr="0">
+            <a:noAutofit/>
+          </a:bodyPr>
+          <a:lstStyle/>
+          <a:p>
+            <a:pPr marL="0" marR="0" lvl="0" indent="0" algn="l" rtl="0">
+              <a:spcBef>
+                <a:spcPts val="0"/>
+              </a:spcBef>
+              <a:spcAft>
+                <a:spcPts val="0"/>
+              </a:spcAft>
+              <a:buNone/>
+            </a:pPr>
+            <a:r>
+              <a:rPr lang="en" sz="1300" b="0" i="0" u="none" strike="noStrike" cap="none" dirty="0">
+                <a:solidFill>
+                  <a:srgbClr val="000000"/>
+                </a:solidFill>
+                <a:latin typeface="Calibri"/>
+                <a:ea typeface="Calibri"/>
+                <a:cs typeface="Calibri"/>
+                <a:sym typeface="Calibri"/>
+              </a:rPr>
+              <a:t>1</a:t>
+            </a:r>
+            <a:endParaRPr sz="1300" b="0" i="0" u="none" strike="noStrike" cap="none" dirty="0">
+              <a:solidFill>
+                <a:srgbClr val="000000"/>
+              </a:solidFill>
+              <a:latin typeface="Calibri"/>
+              <a:ea typeface="Calibri"/>
+              <a:cs typeface="Calibri"/>
+              <a:sym typeface="Calibri"/>
+            </a:endParaRPr>
+          </a:p>
+        </p:txBody>
+      </p:sp>
+      <p:sp>
+        <p:nvSpPr>
+          <p:cNvPr id="46" name="Google Shape;67;p14">
+            <a:extLst>
+              <a:ext uri="{FF2B5EF4-FFF2-40B4-BE49-F238E27FC236}">
+                <a16:creationId xmlns:a16="http://schemas.microsoft.com/office/drawing/2014/main" id="{8DC88E89-BC1C-4544-867A-64CB23D0A72F}"/>
+              </a:ext>
+            </a:extLst>
+          </p:cNvPr>
+          <p:cNvSpPr txBox="1"/>
+          <p:nvPr/>
+        </p:nvSpPr>
+        <p:spPr>
+          <a:xfrm>
+            <a:off x="6949032" y="3473837"/>
+            <a:ext cx="1180862" cy="300000"/>
+          </a:xfrm>
+          <a:prstGeom prst="rect">
+            <a:avLst/>
+          </a:prstGeom>
+          <a:noFill/>
+          <a:ln>
+            <a:noFill/>
+          </a:ln>
+        </p:spPr>
+        <p:txBody>
+          <a:bodyPr spcFirstLastPara="1" wrap="square" lIns="91425" tIns="45700" rIns="91425" bIns="45700" anchor="t" anchorCtr="0">
+            <a:noAutofit/>
+          </a:bodyPr>
+          <a:lstStyle/>
+          <a:p>
+            <a:pPr marL="0" marR="0" lvl="0" indent="0" algn="l" rtl="0">
+              <a:spcBef>
+                <a:spcPts val="0"/>
+              </a:spcBef>
+              <a:spcAft>
+                <a:spcPts val="0"/>
+              </a:spcAft>
+              <a:buNone/>
+            </a:pPr>
+            <a:r>
+              <a:rPr lang="en-SG" sz="1300" dirty="0" err="1">
+                <a:latin typeface="Calibri"/>
+                <a:ea typeface="Calibri"/>
+                <a:cs typeface="Calibri"/>
+                <a:sym typeface="Calibri"/>
+              </a:rPr>
+              <a:t>newCommand</a:t>
+            </a:r>
+            <a:endParaRPr sz="1300" b="0" i="0" u="none" strike="noStrike" cap="none" dirty="0">
+              <a:solidFill>
+                <a:srgbClr val="000000"/>
+              </a:solidFill>
+              <a:latin typeface="Calibri"/>
+              <a:ea typeface="Calibri"/>
+              <a:cs typeface="Calibri"/>
+              <a:sym typeface="Calibri"/>
+            </a:endParaRPr>
+          </a:p>
+        </p:txBody>
+      </p:sp>
     </p:spTree>
   </p:cSld>
   <p:clrMapOvr>

</xml_diff>

<commit_message>
Omit activation bars, change Shoco to Duke
</commit_message>
<xml_diff>
--- a/docs/Class Diagram.pptx
+++ b/docs/Class Diagram.pptx
@@ -6253,15 +6253,15 @@
               <a:buNone/>
             </a:pPr>
             <a:r>
-              <a:rPr lang="en" sz="1300">
+              <a:rPr lang="en-SG" sz="1300" dirty="0">
                 <a:latin typeface="Calibri"/>
                 <a:ea typeface="Calibri"/>
                 <a:cs typeface="Calibri"/>
                 <a:sym typeface="Calibri"/>
               </a:rPr>
-              <a:t>Shoco</a:t>
+              <a:t>Duke</a:t>
             </a:r>
-            <a:endParaRPr sz="1300"/>
+            <a:endParaRPr sz="1300" dirty="0"/>
           </a:p>
         </p:txBody>
       </p:sp>

</xml_diff>